<commit_message>
Resumindo os Slides sobre Arquitetura Hexagonal e Serverless
</commit_message>
<xml_diff>
--- a/aulas/gsi526/aula13-devops.pptx
+++ b/aulas/gsi526/aula13-devops.pptx
@@ -5717,6 +5717,44 @@
           </a:p>
         </p:txBody>
       </p:sp>
+      <p:sp>
+        <p:nvSpPr>
+          <p:cNvPr id="2" name="Rectangle 1"/>
+          <p:cNvSpPr/>
+          <p:nvPr/>
+        </p:nvSpPr>
+        <p:spPr>
+          <a:xfrm>
+            <a:off x="2671593" y="4355440"/>
+            <a:ext cx="4105612" cy="307777"/>
+          </a:xfrm>
+          <a:prstGeom prst="rect">
+            <a:avLst/>
+          </a:prstGeom>
+        </p:spPr>
+        <p:txBody>
+          <a:bodyPr wrap="none">
+            <a:spAutoFit/>
+          </a:bodyPr>
+          <a:lstStyle/>
+          <a:p>
+            <a:pPr lvl="0" algn="ctr"/>
+            <a:r>
+              <a:rPr lang="pt-BR" dirty="0">
+                <a:solidFill>
+                  <a:srgbClr val="FF0000"/>
+                </a:solidFill>
+              </a:rPr>
+              <a:t>Slides do prof. Marco Tulio Valente (DCC/UFMG)</a:t>
+            </a:r>
+            <a:endParaRPr lang="pt-BR" dirty="0">
+              <a:solidFill>
+                <a:srgbClr val="FF0000"/>
+              </a:solidFill>
+            </a:endParaRPr>
+          </a:p>
+        </p:txBody>
+      </p:sp>
     </p:spTree>
   </p:cSld>
   <p:clrMapOvr>
@@ -7478,7 +7516,6 @@
               <a:rPr lang="pt-BR" sz="2000" dirty="0"/>
               <a:t>infraestrutura, etc.</a:t>
             </a:r>
-            <a:endParaRPr lang="pt-BR" sz="2000" dirty="0"/>
           </a:p>
           <a:p>
             <a:pPr>
@@ -7944,11 +7981,7 @@
             <a:pPr algn="ctr"/>
             <a:r>
               <a:rPr lang="pt-BR" dirty="0" smtClean="0"/>
-              <a:t>Servidores </a:t>
-            </a:r>
-            <a:r>
-              <a:rPr lang="pt-BR" dirty="0" smtClean="0"/>
-              <a:t>de Integração Contínua (Exemplo)</a:t>
+              <a:t>Servidores de Integração Contínua (Exemplo)</a:t>
             </a:r>
             <a:endParaRPr lang="pt-BR" dirty="0"/>
           </a:p>

</xml_diff>